<commit_message>
Ben's name fix on poster
</commit_message>
<xml_diff>
--- a/poster/Poster.pptx
+++ b/poster/Poster.pptx
@@ -332,7 +332,7 @@
           <a:p>
             <a:fld id="{BE026375-C1E2-4094-ABF6-62AEA64AAD18}" type="slidenum">
               <a:rPr lang="en-US" smtClean="0"/>
-              <a:t>‹Nº›</a:t>
+              <a:t>‹#›</a:t>
             </a:fld>
             <a:endParaRPr lang="en-US"/>
           </a:p>
@@ -502,7 +502,7 @@
           <a:p>
             <a:fld id="{BE026375-C1E2-4094-ABF6-62AEA64AAD18}" type="slidenum">
               <a:rPr lang="en-US" smtClean="0"/>
-              <a:t>‹Nº›</a:t>
+              <a:t>‹#›</a:t>
             </a:fld>
             <a:endParaRPr lang="en-US"/>
           </a:p>
@@ -682,7 +682,7 @@
           <a:p>
             <a:fld id="{BE026375-C1E2-4094-ABF6-62AEA64AAD18}" type="slidenum">
               <a:rPr lang="en-US" smtClean="0"/>
-              <a:t>‹Nº›</a:t>
+              <a:t>‹#›</a:t>
             </a:fld>
             <a:endParaRPr lang="en-US"/>
           </a:p>
@@ -852,7 +852,7 @@
           <a:p>
             <a:fld id="{BE026375-C1E2-4094-ABF6-62AEA64AAD18}" type="slidenum">
               <a:rPr lang="en-US" smtClean="0"/>
-              <a:t>‹Nº›</a:t>
+              <a:t>‹#›</a:t>
             </a:fld>
             <a:endParaRPr lang="en-US"/>
           </a:p>
@@ -1098,7 +1098,7 @@
           <a:p>
             <a:fld id="{BE026375-C1E2-4094-ABF6-62AEA64AAD18}" type="slidenum">
               <a:rPr lang="en-US" smtClean="0"/>
-              <a:t>‹Nº›</a:t>
+              <a:t>‹#›</a:t>
             </a:fld>
             <a:endParaRPr lang="en-US"/>
           </a:p>
@@ -1386,7 +1386,7 @@
           <a:p>
             <a:fld id="{BE026375-C1E2-4094-ABF6-62AEA64AAD18}" type="slidenum">
               <a:rPr lang="en-US" smtClean="0"/>
-              <a:t>‹Nº›</a:t>
+              <a:t>‹#›</a:t>
             </a:fld>
             <a:endParaRPr lang="en-US"/>
           </a:p>
@@ -1808,7 +1808,7 @@
           <a:p>
             <a:fld id="{BE026375-C1E2-4094-ABF6-62AEA64AAD18}" type="slidenum">
               <a:rPr lang="en-US" smtClean="0"/>
-              <a:t>‹Nº›</a:t>
+              <a:t>‹#›</a:t>
             </a:fld>
             <a:endParaRPr lang="en-US"/>
           </a:p>
@@ -1926,7 +1926,7 @@
           <a:p>
             <a:fld id="{BE026375-C1E2-4094-ABF6-62AEA64AAD18}" type="slidenum">
               <a:rPr lang="en-US" smtClean="0"/>
-              <a:t>‹Nº›</a:t>
+              <a:t>‹#›</a:t>
             </a:fld>
             <a:endParaRPr lang="en-US"/>
           </a:p>
@@ -2021,7 +2021,7 @@
           <a:p>
             <a:fld id="{BE026375-C1E2-4094-ABF6-62AEA64AAD18}" type="slidenum">
               <a:rPr lang="en-US" smtClean="0"/>
-              <a:t>‹Nº›</a:t>
+              <a:t>‹#›</a:t>
             </a:fld>
             <a:endParaRPr lang="en-US"/>
           </a:p>
@@ -2298,7 +2298,7 @@
           <a:p>
             <a:fld id="{BE026375-C1E2-4094-ABF6-62AEA64AAD18}" type="slidenum">
               <a:rPr lang="en-US" smtClean="0"/>
-              <a:t>‹Nº›</a:t>
+              <a:t>‹#›</a:t>
             </a:fld>
             <a:endParaRPr lang="en-US"/>
           </a:p>
@@ -2551,7 +2551,7 @@
           <a:p>
             <a:fld id="{BE026375-C1E2-4094-ABF6-62AEA64AAD18}" type="slidenum">
               <a:rPr lang="en-US" smtClean="0"/>
-              <a:t>‹Nº›</a:t>
+              <a:t>‹#›</a:t>
             </a:fld>
             <a:endParaRPr lang="en-US"/>
           </a:p>
@@ -2800,7 +2800,7 @@
           <a:p>
             <a:fld id="{BE026375-C1E2-4094-ABF6-62AEA64AAD18}" type="slidenum">
               <a:rPr lang="en-US" smtClean="0"/>
-              <a:t>‹Nº›</a:t>
+              <a:t>‹#›</a:t>
             </a:fld>
             <a:endParaRPr lang="en-US"/>
           </a:p>
@@ -3159,10 +3159,10 @@
               <a:t>Ben </a:t>
             </a:r>
             <a:r>
-              <a:rPr lang="en-US" sz="4400" dirty="0" err="1" smtClean="0">
+              <a:rPr lang="en-US" sz="4400" smtClean="0">
                 <a:latin typeface="+mj-lt"/>
               </a:rPr>
-              <a:t>Humbertson</a:t>
+              <a:t>Humberston</a:t>
             </a:r>
             <a:r>
               <a:rPr lang="en-US" sz="4400" dirty="0" smtClean="0">
@@ -3296,11 +3296,7 @@
             </a:r>
             <a:r>
               <a:rPr lang="en-US" sz="2400" dirty="0" smtClean="0"/>
-              <a:t>estimated in </a:t>
-            </a:r>
-            <a:r>
-              <a:rPr lang="en-US" sz="2400" dirty="0" smtClean="0"/>
-              <a:t>most cases. Therefore, many researchers have turned their attention towards machine learning methods to create simplified models based on available </a:t>
+              <a:t>estimated in most cases. Therefore, many researchers have turned their attention towards machine learning methods to create simplified models based on available </a:t>
             </a:r>
             <a:r>
               <a:rPr lang="en-US" sz="2400" dirty="0"/>
@@ -3370,11 +3366,7 @@
             <a:pPr algn="just"/>
             <a:r>
               <a:rPr lang="en-US" sz="2400" dirty="0" smtClean="0"/>
-              <a:t>As opposed to measurements from weather stations, satellite observations offer total spatial coverage at the cost of reduced precision</a:t>
-            </a:r>
-            <a:r>
-              <a:rPr lang="en-US" sz="2400" dirty="0" smtClean="0"/>
-              <a:t>. Figure 1 shows samples from the North America Data Assimilation System (NLDAS) satellite-based observations available from the GES-DISC at NASA: values for the different meteorological variables are provided hourly for each cell within a regular grid.</a:t>
+              <a:t>As opposed to measurements from weather stations, satellite observations offer total spatial coverage at the cost of reduced precision. Figure 1 shows samples from the North America Data Assimilation System (NLDAS) satellite-based observations available from the GES-DISC at NASA: values for the different meteorological variables are provided hourly for each cell within a regular grid.</a:t>
             </a:r>
             <a:endParaRPr lang="en-US" sz="2400" dirty="0"/>
           </a:p>
@@ -3479,7 +3471,7 @@
               <a:t>values </a:t>
             </a:r>
             <a:r>
-              <a:rPr lang="en-US" sz="2400" i="1" dirty="0" smtClean="0"/>
+              <a:rPr lang="en-US" sz="2400" b="1" i="1" dirty="0" smtClean="0"/>
               <a:t>X</a:t>
             </a:r>
             <a:r>
@@ -3573,6 +3565,7 @@
               </a:bodyPr>
               <a:lstStyle/>
               <a:p>
+                <a:pPr/>
                 <a14:m>
                   <m:oMathPara xmlns:m="http://schemas.openxmlformats.org/officeDocument/2006/math">
                     <m:oMathParaPr>
@@ -3611,10 +3604,10 @@
                         <m:t>=</m:t>
                       </m:r>
                       <m:r>
-                        <a:rPr lang="es-CO" sz="2400" b="0" i="1" smtClean="0">
+                        <a:rPr lang="es-CO" sz="2400" b="1" i="1" smtClean="0">
                           <a:latin typeface="Cambria Math"/>
                         </a:rPr>
-                        <m:t>𝑐</m:t>
+                        <m:t>𝒄</m:t>
                       </m:r>
                       <m:r>
                         <a:rPr lang="es-CO" sz="2400" b="0" i="1" smtClean="0">
@@ -3817,7 +3810,7 @@
               <a:lstStyle/>
               <a:p>
                 <a:r>
-                  <a:rPr lang="es-MX">
+                  <a:rPr lang="en-US">
                     <a:noFill/>
                   </a:rPr>
                   <a:t> </a:t>
@@ -3827,8 +3820,8 @@
           </p:sp>
         </mc:Fallback>
       </mc:AlternateContent>
-      <mc:AlternateContent xmlns:mc="http://schemas.openxmlformats.org/markup-compatibility/2006">
-        <mc:Choice xmlns:a14="http://schemas.microsoft.com/office/drawing/2010/main" Requires="a14">
+      <mc:AlternateContent xmlns:mc="http://schemas.openxmlformats.org/markup-compatibility/2006" xmlns:a14="http://schemas.microsoft.com/office/drawing/2010/main">
+        <mc:Choice Requires="a14">
           <p:sp>
             <p:nvSpPr>
               <p:cNvPr id="31" name="TextBox 3"/>
@@ -3918,7 +3911,7 @@
             </p:txBody>
           </p:sp>
         </mc:Choice>
-        <mc:Fallback>
+        <mc:Fallback xmlns="">
           <p:sp>
             <p:nvSpPr>
               <p:cNvPr id="31" name="TextBox 3"/>
@@ -3966,7 +3959,7 @@
         <p:spPr>
           <a:xfrm>
             <a:off x="13177714" y="4927997"/>
-            <a:ext cx="9937104" cy="2308324"/>
+            <a:ext cx="9937104" cy="1938992"/>
           </a:xfrm>
           <a:prstGeom prst="rect">
             <a:avLst/>
@@ -3982,8 +3975,9 @@
             <a:pPr algn="just"/>
             <a:r>
               <a:rPr lang="en-US" sz="2400" dirty="0" smtClean="0"/>
-              <a:t>Three aspects for the setup of the model were considered:</a:t>
-            </a:r>
+              <a:t>Three aspects of the input data for the model were considered:</a:t>
+            </a:r>
+            <a:endParaRPr lang="en-US" sz="2400" dirty="0" smtClean="0"/>
           </a:p>
           <a:p>
             <a:pPr marL="520700" indent="-342900">
@@ -3991,9 +3985,18 @@
               <a:buChar char="•"/>
             </a:pPr>
             <a:r>
+              <a:rPr lang="en-US" sz="2400" dirty="0"/>
+              <a:t>Whether or not to use values on neighboring cells (neighborhood radius </a:t>
+            </a:r>
+            <a:r>
+              <a:rPr lang="en-US" sz="2400" i="1" dirty="0"/>
+              <a:t>r</a:t>
+            </a:r>
+            <a:r>
               <a:rPr lang="en-US" sz="2400" dirty="0" smtClean="0"/>
-              <a:t>Using the past values of the same variable vs. using the past values of all the variables</a:t>
-            </a:r>
+              <a:t>)</a:t>
+            </a:r>
+            <a:endParaRPr lang="en-US" sz="2400" dirty="0" smtClean="0"/>
           </a:p>
           <a:p>
             <a:pPr marL="520700" indent="-342900">
@@ -4002,16 +4005,13 @@
             </a:pPr>
             <a:r>
               <a:rPr lang="en-US" sz="2400" dirty="0" smtClean="0"/>
-              <a:t>The number of previous states to consider (</a:t>
-            </a:r>
-            <a:r>
-              <a:rPr lang="en-US" sz="2400" i="1" dirty="0" smtClean="0"/>
-              <a:t>p</a:t>
+              <a:t>Whether to predict different variables independently or to </a:t>
             </a:r>
             <a:r>
               <a:rPr lang="en-US" sz="2400" dirty="0" smtClean="0"/>
-              <a:t>)</a:t>
-            </a:r>
+              <a:t>measure interdependencies between variables</a:t>
+            </a:r>
+            <a:endParaRPr lang="en-US" sz="2400" dirty="0" smtClean="0"/>
           </a:p>
           <a:p>
             <a:pPr marL="520700" indent="-342900">
@@ -4020,11 +4020,19 @@
             </a:pPr>
             <a:r>
               <a:rPr lang="en-US" sz="2400" dirty="0" smtClean="0"/>
-              <a:t>Whether or not to include the values on neighboring cells (neighborhood radius </a:t>
+              <a:t>The </a:t>
+            </a:r>
+            <a:r>
+              <a:rPr lang="en-US" sz="2400" dirty="0"/>
+              <a:t>number of previous states to include in the model </a:t>
+            </a:r>
+            <a:r>
+              <a:rPr lang="en-US" sz="2400" dirty="0" smtClean="0"/>
+              <a:t>(VAR lag order </a:t>
             </a:r>
             <a:r>
               <a:rPr lang="en-US" sz="2400" i="1" dirty="0" smtClean="0"/>
-              <a:t>r</a:t>
+              <a:t>p</a:t>
             </a:r>
             <a:r>
               <a:rPr lang="en-US" sz="2400" dirty="0" smtClean="0"/>
@@ -4154,7 +4162,7 @@
         <p:spPr>
           <a:xfrm>
             <a:off x="14217632" y="14722906"/>
-            <a:ext cx="7569236" cy="830997"/>
+            <a:ext cx="7569236" cy="1200329"/>
           </a:xfrm>
           <a:prstGeom prst="rect">
             <a:avLst/>
@@ -4213,7 +4221,19 @@
             </a:r>
             <a:r>
               <a:rPr lang="en-US" sz="2400" dirty="0" smtClean="0"/>
-              <a:t>. Single-variable model; b. Multivariate model</a:t>
+              <a:t>. </a:t>
+            </a:r>
+            <a:r>
+              <a:rPr lang="en-US" sz="2400" dirty="0" smtClean="0"/>
+              <a:t>Independent variable model</a:t>
+            </a:r>
+            <a:r>
+              <a:rPr lang="en-US" sz="2400" dirty="0" smtClean="0"/>
+              <a:t>; b. </a:t>
+            </a:r>
+            <a:r>
+              <a:rPr lang="en-US" sz="2400" dirty="0" smtClean="0"/>
+              <a:t>Model with interdependencies between variables</a:t>
             </a:r>
             <a:endParaRPr lang="en-US" sz="2400" dirty="0"/>
           </a:p>
@@ -4311,11 +4331,7 @@
             </a:r>
             <a:r>
               <a:rPr lang="en-US" sz="2400" dirty="0" smtClean="0"/>
-              <a:t>G</a:t>
-            </a:r>
-            <a:r>
-              <a:rPr lang="en-US" sz="2400" dirty="0" smtClean="0"/>
-              <a:t>ridded values for the weather variables are available every hour from NLDAS </a:t>
+              <a:t>Gridded values for the weather variables are available every hour from NLDAS </a:t>
             </a:r>
             <a:endParaRPr lang="en-US" sz="2400" dirty="0"/>
           </a:p>

</xml_diff>

<commit_message>
Fig 5 added to poster
</commit_message>
<xml_diff>
--- a/poster/Poster.pptx
+++ b/poster/Poster.pptx
@@ -330,7 +330,7 @@
           <a:p>
             <a:fld id="{BE026375-C1E2-4094-ABF6-62AEA64AAD18}" type="slidenum">
               <a:rPr lang="en-US" smtClean="0"/>
-              <a:t>‹Nº›</a:t>
+              <a:t>‹#›</a:t>
             </a:fld>
             <a:endParaRPr lang="en-US"/>
           </a:p>
@@ -500,7 +500,7 @@
           <a:p>
             <a:fld id="{BE026375-C1E2-4094-ABF6-62AEA64AAD18}" type="slidenum">
               <a:rPr lang="en-US" smtClean="0"/>
-              <a:t>‹Nº›</a:t>
+              <a:t>‹#›</a:t>
             </a:fld>
             <a:endParaRPr lang="en-US"/>
           </a:p>
@@ -680,7 +680,7 @@
           <a:p>
             <a:fld id="{BE026375-C1E2-4094-ABF6-62AEA64AAD18}" type="slidenum">
               <a:rPr lang="en-US" smtClean="0"/>
-              <a:t>‹Nº›</a:t>
+              <a:t>‹#›</a:t>
             </a:fld>
             <a:endParaRPr lang="en-US"/>
           </a:p>
@@ -850,7 +850,7 @@
           <a:p>
             <a:fld id="{BE026375-C1E2-4094-ABF6-62AEA64AAD18}" type="slidenum">
               <a:rPr lang="en-US" smtClean="0"/>
-              <a:t>‹Nº›</a:t>
+              <a:t>‹#›</a:t>
             </a:fld>
             <a:endParaRPr lang="en-US"/>
           </a:p>
@@ -1096,7 +1096,7 @@
           <a:p>
             <a:fld id="{BE026375-C1E2-4094-ABF6-62AEA64AAD18}" type="slidenum">
               <a:rPr lang="en-US" smtClean="0"/>
-              <a:t>‹Nº›</a:t>
+              <a:t>‹#›</a:t>
             </a:fld>
             <a:endParaRPr lang="en-US"/>
           </a:p>
@@ -1384,7 +1384,7 @@
           <a:p>
             <a:fld id="{BE026375-C1E2-4094-ABF6-62AEA64AAD18}" type="slidenum">
               <a:rPr lang="en-US" smtClean="0"/>
-              <a:t>‹Nº›</a:t>
+              <a:t>‹#›</a:t>
             </a:fld>
             <a:endParaRPr lang="en-US"/>
           </a:p>
@@ -1806,7 +1806,7 @@
           <a:p>
             <a:fld id="{BE026375-C1E2-4094-ABF6-62AEA64AAD18}" type="slidenum">
               <a:rPr lang="en-US" smtClean="0"/>
-              <a:t>‹Nº›</a:t>
+              <a:t>‹#›</a:t>
             </a:fld>
             <a:endParaRPr lang="en-US"/>
           </a:p>
@@ -1924,7 +1924,7 @@
           <a:p>
             <a:fld id="{BE026375-C1E2-4094-ABF6-62AEA64AAD18}" type="slidenum">
               <a:rPr lang="en-US" smtClean="0"/>
-              <a:t>‹Nº›</a:t>
+              <a:t>‹#›</a:t>
             </a:fld>
             <a:endParaRPr lang="en-US"/>
           </a:p>
@@ -2019,7 +2019,7 @@
           <a:p>
             <a:fld id="{BE026375-C1E2-4094-ABF6-62AEA64AAD18}" type="slidenum">
               <a:rPr lang="en-US" smtClean="0"/>
-              <a:t>‹Nº›</a:t>
+              <a:t>‹#›</a:t>
             </a:fld>
             <a:endParaRPr lang="en-US"/>
           </a:p>
@@ -2296,7 +2296,7 @@
           <a:p>
             <a:fld id="{BE026375-C1E2-4094-ABF6-62AEA64AAD18}" type="slidenum">
               <a:rPr lang="en-US" smtClean="0"/>
-              <a:t>‹Nº›</a:t>
+              <a:t>‹#›</a:t>
             </a:fld>
             <a:endParaRPr lang="en-US"/>
           </a:p>
@@ -2549,7 +2549,7 @@
           <a:p>
             <a:fld id="{BE026375-C1E2-4094-ABF6-62AEA64AAD18}" type="slidenum">
               <a:rPr lang="en-US" smtClean="0"/>
-              <a:t>‹Nº›</a:t>
+              <a:t>‹#›</a:t>
             </a:fld>
             <a:endParaRPr lang="en-US"/>
           </a:p>
@@ -2798,7 +2798,7 @@
           <a:p>
             <a:fld id="{BE026375-C1E2-4094-ABF6-62AEA64AAD18}" type="slidenum">
               <a:rPr lang="en-US" smtClean="0"/>
-              <a:t>‹Nº›</a:t>
+              <a:t>‹#›</a:t>
             </a:fld>
             <a:endParaRPr lang="en-US"/>
           </a:p>
@@ -3172,13 +3172,7 @@
               <a:rPr lang="en-US" sz="4400" dirty="0" smtClean="0">
                 <a:latin typeface="+mj-lt"/>
               </a:rPr>
-              <a:t> </a:t>
-            </a:r>
-            <a:r>
-              <a:rPr lang="en-US" sz="4400" dirty="0" smtClean="0">
-                <a:latin typeface="+mj-lt"/>
-              </a:rPr>
-              <a:t>and Felipe </a:t>
+              <a:t> and Felipe </a:t>
             </a:r>
             <a:r>
               <a:rPr lang="en-US" sz="4400" dirty="0" err="1">
@@ -3212,7 +3206,7 @@
         </p:nvSpPr>
         <p:spPr>
           <a:xfrm>
-            <a:off x="24554978" y="23570598"/>
+            <a:off x="24554978" y="23714614"/>
             <a:ext cx="11305656" cy="1200329"/>
           </a:xfrm>
           <a:prstGeom prst="rect">
@@ -3294,11 +3288,7 @@
             </a:r>
             <a:r>
               <a:rPr lang="en-US" sz="2400" dirty="0" smtClean="0"/>
-              <a:t>estimated in most cases. Therefore, many researchers have turned their attention towards machine learning methods to create simplified models based on available </a:t>
-            </a:r>
-            <a:r>
-              <a:rPr lang="en-US" sz="2400" dirty="0" smtClean="0"/>
-              <a:t>observations ([1] and [2]). </a:t>
+              <a:t>estimated in most cases. Therefore, many researchers have turned their attention towards machine learning methods to create simplified models based on available observations ([1] and [2]). </a:t>
             </a:r>
             <a:r>
               <a:rPr lang="en-US" sz="2400" dirty="0"/>
@@ -3383,15 +3373,7 @@
             <a:pPr algn="just"/>
             <a:r>
               <a:rPr lang="en-US" sz="2400" dirty="0" smtClean="0"/>
-              <a:t>As opposed to measurements from weather stations, satellite observations offer total spatial coverage at the cost of reduced precision. Figure 1 shows samples from the North America Data Assimilation System (NLDAS) satellite-based observations available from the GES-DISC at </a:t>
-            </a:r>
-            <a:r>
-              <a:rPr lang="en-US" sz="2400" dirty="0" smtClean="0"/>
-              <a:t>NASA [3]: </a:t>
-            </a:r>
-            <a:r>
-              <a:rPr lang="en-US" sz="2400" dirty="0" smtClean="0"/>
-              <a:t>values for the different meteorological variables are provided hourly for each cell within a regular grid.</a:t>
+              <a:t>As opposed to measurements from weather stations, satellite observations offer total spatial coverage at the cost of reduced precision. Figure 1 shows samples from the North America Data Assimilation System (NLDAS) satellite-based observations available from the GES-DISC at NASA [3]: values for the different meteorological variables are provided hourly for each cell within a regular grid.</a:t>
             </a:r>
             <a:endParaRPr lang="en-US" sz="2400" dirty="0"/>
           </a:p>
@@ -3484,11 +3466,11 @@
             </a:r>
             <a:r>
               <a:rPr lang="en-US" sz="2400" dirty="0"/>
-              <a:t>) model </a:t>
-            </a:r>
-            <a:r>
-              <a:rPr lang="en-US" sz="2400" dirty="0" smtClean="0"/>
-              <a:t>[4] in </a:t>
+              <a:t>) </a:t>
+            </a:r>
+            <a:r>
+              <a:rPr lang="en-US" sz="2400" dirty="0" smtClean="0"/>
+              <a:t>model in </a:t>
             </a:r>
             <a:r>
               <a:rPr lang="en-US" sz="2400" dirty="0"/>
@@ -3496,15 +3478,7 @@
             </a:r>
             <a:r>
               <a:rPr lang="en-US" sz="2400" dirty="0" smtClean="0"/>
-              <a:t>system over </a:t>
-            </a:r>
-            <a:r>
-              <a:rPr lang="en-US" sz="2400" dirty="0"/>
-              <a:t>time. </a:t>
-            </a:r>
-            <a:r>
-              <a:rPr lang="en-US" sz="2400" dirty="0" smtClean="0"/>
-              <a:t>The </a:t>
+              <a:t>system over time (see [4], [5] for details on the VAR approach). The </a:t>
             </a:r>
             <a:r>
               <a:rPr lang="en-US" sz="2400" dirty="0"/>
@@ -3604,8 +3578,8 @@
           </a:p>
         </p:txBody>
       </p:sp>
-      <mc:AlternateContent xmlns:mc="http://schemas.openxmlformats.org/markup-compatibility/2006">
-        <mc:Choice xmlns:a14="http://schemas.microsoft.com/office/drawing/2010/main" Requires="a14">
+      <mc:AlternateContent xmlns:mc="http://schemas.openxmlformats.org/markup-compatibility/2006" xmlns:a14="http://schemas.microsoft.com/office/drawing/2010/main">
+        <mc:Choice Requires="a14">
           <p:sp>
             <p:nvSpPr>
               <p:cNvPr id="30" name="29 CuadroTexto"/>
@@ -3844,7 +3818,7 @@
             </p:txBody>
           </p:sp>
         </mc:Choice>
-        <mc:Fallback>
+        <mc:Fallback xmlns="">
           <p:sp>
             <p:nvSpPr>
               <p:cNvPr id="30" name="29 CuadroTexto"/>
@@ -3883,8 +3857,8 @@
           </p:sp>
         </mc:Fallback>
       </mc:AlternateContent>
-      <mc:AlternateContent xmlns:mc="http://schemas.openxmlformats.org/markup-compatibility/2006">
-        <mc:Choice xmlns:a14="http://schemas.microsoft.com/office/drawing/2010/main" Requires="a14">
+      <mc:AlternateContent xmlns:mc="http://schemas.openxmlformats.org/markup-compatibility/2006" xmlns:a14="http://schemas.microsoft.com/office/drawing/2010/main">
+        <mc:Choice Requires="a14">
           <p:sp>
             <p:nvSpPr>
               <p:cNvPr id="31" name="TextBox 3"/>
@@ -3974,7 +3948,7 @@
             </p:txBody>
           </p:sp>
         </mc:Choice>
-        <mc:Fallback>
+        <mc:Fallback xmlns="">
           <p:sp>
             <p:nvSpPr>
               <p:cNvPr id="31" name="TextBox 3"/>
@@ -4498,8 +4472,8 @@
         </p:nvSpPr>
         <p:spPr>
           <a:xfrm>
-            <a:off x="24554978" y="14734514"/>
-            <a:ext cx="10585176" cy="461665"/>
+            <a:off x="24554978" y="13412827"/>
+            <a:ext cx="10585176" cy="4524315"/>
           </a:xfrm>
           <a:prstGeom prst="rect">
             <a:avLst/>
@@ -4512,12 +4486,125 @@
           </a:bodyPr>
           <a:lstStyle/>
           <a:p>
-            <a:pPr algn="just"/>
-            <a:r>
-              <a:rPr lang="en-US" sz="2400" dirty="0" smtClean="0"/>
-              <a:t>Conclusions</a:t>
+            <a:pPr marL="342900" indent="-342900">
+              <a:buFontTx/>
+              <a:buChar char="-"/>
+            </a:pPr>
+            <a:r>
+              <a:rPr lang="en-US" sz="2400" dirty="0" err="1" smtClean="0"/>
+              <a:t>Overfitting</a:t>
+            </a:r>
+            <a:r>
+              <a:rPr lang="en-US" sz="2400" dirty="0" smtClean="0"/>
+              <a:t> </a:t>
+            </a:r>
+            <a:r>
+              <a:rPr lang="en-US" sz="2400" dirty="0"/>
+              <a:t>for higher order lags; need regularization (lasso &amp; fused lasso</a:t>
+            </a:r>
+            <a:r>
+              <a:rPr lang="en-US" sz="2400" dirty="0" smtClean="0"/>
+              <a:t>)</a:t>
+            </a:r>
+          </a:p>
+          <a:p>
+            <a:pPr marL="342900" indent="-342900">
+              <a:buFontTx/>
+              <a:buChar char="-"/>
+            </a:pPr>
+            <a:r>
+              <a:rPr lang="en-US" sz="2400" dirty="0" smtClean="0"/>
+              <a:t>Some </a:t>
+            </a:r>
+            <a:r>
+              <a:rPr lang="en-US" sz="2400" dirty="0"/>
+              <a:t>variables easy to predict (temperature &amp; pressure); some hard due to </a:t>
+            </a:r>
+            <a:r>
+              <a:rPr lang="en-US" sz="2400" dirty="0" err="1"/>
+              <a:t>sparsity</a:t>
+            </a:r>
+            <a:r>
+              <a:rPr lang="en-US" sz="2400" dirty="0"/>
+              <a:t> (precipitation)	</a:t>
             </a:r>
             <a:endParaRPr lang="en-US" sz="2400" dirty="0"/>
+          </a:p>
+          <a:p>
+            <a:pPr marL="342900" indent="-342900">
+              <a:buFontTx/>
+              <a:buChar char="-"/>
+            </a:pPr>
+            <a:r>
+              <a:rPr lang="en-US" sz="2400" dirty="0" smtClean="0"/>
+              <a:t>Adding </a:t>
+            </a:r>
+            <a:r>
+              <a:rPr lang="en-US" sz="2400" dirty="0"/>
+              <a:t>neighboring cells or adding other variables to the model doesn't significantly improve accuracy </a:t>
+            </a:r>
+            <a:endParaRPr lang="en-US" sz="2400" dirty="0"/>
+          </a:p>
+          <a:p>
+            <a:pPr marL="2090430" lvl="1" indent="-342900">
+              <a:buFontTx/>
+              <a:buChar char="-"/>
+            </a:pPr>
+            <a:r>
+              <a:rPr lang="en-US" sz="2400" dirty="0" smtClean="0"/>
+              <a:t>IE</a:t>
+            </a:r>
+            <a:r>
+              <a:rPr lang="en-US" sz="2400" dirty="0"/>
+              <a:t>: we get the same performance using a very simple lag order of 1 or 2 and just looking at values for same variable at same </a:t>
+            </a:r>
+            <a:r>
+              <a:rPr lang="en-US" sz="2400" dirty="0" smtClean="0"/>
+              <a:t>cell</a:t>
+            </a:r>
+            <a:endParaRPr lang="en-US" sz="2400" dirty="0"/>
+          </a:p>
+          <a:p>
+            <a:pPr marL="2090430" lvl="1" indent="-342900">
+              <a:buFontTx/>
+              <a:buChar char="-"/>
+            </a:pPr>
+            <a:r>
+              <a:rPr lang="en-US" sz="2400" dirty="0" smtClean="0"/>
+              <a:t>Problem might be too easy… just linearly extrapolating works well</a:t>
+            </a:r>
+          </a:p>
+          <a:p>
+            <a:pPr marL="3837953" lvl="2" indent="-342900">
+              <a:buFontTx/>
+              <a:buChar char="-"/>
+            </a:pPr>
+            <a:r>
+              <a:rPr lang="en-US" sz="2400" dirty="0" smtClean="0"/>
+              <a:t>Harder </a:t>
+            </a:r>
+            <a:r>
+              <a:rPr lang="en-US" sz="2400" dirty="0"/>
+              <a:t>problem would be to forecast many steps into the </a:t>
+            </a:r>
+            <a:r>
+              <a:rPr lang="en-US" sz="2400" dirty="0" smtClean="0"/>
+              <a:t>future</a:t>
+            </a:r>
+          </a:p>
+          <a:p>
+            <a:pPr marL="3837953" lvl="2" indent="-342900">
+              <a:buFontTx/>
+              <a:buChar char="-"/>
+            </a:pPr>
+            <a:r>
+              <a:rPr lang="en-US" sz="2400" dirty="0" smtClean="0"/>
+              <a:t>Have </a:t>
+            </a:r>
+            <a:r>
+              <a:rPr lang="en-US" sz="2400" dirty="0"/>
+              <a:t>preliminary results for this if possible (5 or so steps into the future, how does the model fare?)</a:t>
+            </a:r>
           </a:p>
         </p:txBody>
       </p:sp>
@@ -4529,7 +4616,7 @@
         </p:nvSpPr>
         <p:spPr>
           <a:xfrm>
-            <a:off x="24554978" y="14211294"/>
+            <a:off x="24554978" y="12889607"/>
             <a:ext cx="10585176" cy="523220"/>
           </a:xfrm>
           <a:prstGeom prst="rect">
@@ -4576,7 +4663,7 @@
         <p:spPr>
           <a:xfrm>
             <a:off x="24554978" y="19031767"/>
-            <a:ext cx="10585176" cy="4154984"/>
+            <a:ext cx="10585176" cy="4893647"/>
           </a:xfrm>
           <a:prstGeom prst="rect">
             <a:avLst/>
@@ -4754,10 +4841,41 @@
             </a:r>
           </a:p>
           <a:p>
+            <a:pPr marL="457200" indent="-457200" algn="just"/>
+            <a:r>
+              <a:rPr lang="en-US" sz="2400" dirty="0" smtClean="0"/>
+              <a:t>[4] </a:t>
+            </a:r>
+            <a:r>
+              <a:rPr lang="en-US" sz="2400" dirty="0" err="1" smtClean="0"/>
+              <a:t>Lutkepohl</a:t>
+            </a:r>
+            <a:r>
+              <a:rPr lang="en-US" sz="2400" dirty="0" smtClean="0"/>
+              <a:t>, H. (1991), </a:t>
+            </a:r>
+            <a:r>
+              <a:rPr lang="en-US" sz="2400" i="1" dirty="0" smtClean="0"/>
+              <a:t>Introduction to Multiple Time Series Analysis</a:t>
+            </a:r>
+            <a:r>
+              <a:rPr lang="en-US" sz="2400" dirty="0" smtClean="0"/>
+              <a:t>. Springer-</a:t>
+            </a:r>
+            <a:r>
+              <a:rPr lang="en-US" sz="2400" dirty="0" err="1" smtClean="0"/>
+              <a:t>Verlag</a:t>
+            </a:r>
+            <a:r>
+              <a:rPr lang="en-US" sz="2400" dirty="0" smtClean="0"/>
+              <a:t>, Berlin.</a:t>
+            </a:r>
+          </a:p>
+          <a:p>
             <a:pPr marL="457200" indent="-457200"/>
             <a:r>
               <a:rPr lang="en-US" sz="2400" dirty="0" smtClean="0"/>
-              <a:t>[4] </a:t>
+              <a:t>[5] </a:t>
             </a:r>
             <a:r>
               <a:rPr lang="en-US" sz="2400" dirty="0" err="1" smtClean="0"/>
@@ -4765,15 +4883,7 @@
             </a:r>
             <a:r>
               <a:rPr lang="en-US" sz="2400" dirty="0" smtClean="0"/>
-              <a:t>, E. and Wang, J. (2006), </a:t>
-            </a:r>
-            <a:r>
-              <a:rPr lang="en-US" sz="2400" dirty="0" err="1" smtClean="0"/>
-              <a:t>V”ector</a:t>
-            </a:r>
-            <a:r>
-              <a:rPr lang="en-US" sz="2400" dirty="0" smtClean="0"/>
-              <a:t> </a:t>
+              <a:t>, E. and Wang, J. (2006), Vector </a:t>
             </a:r>
             <a:r>
               <a:rPr lang="en-US" sz="2400" dirty="0"/>
@@ -4807,7 +4917,6 @@
               <a:rPr lang="en-US" sz="2400" dirty="0"/>
               <a:t>.</a:t>
             </a:r>
-            <a:endParaRPr lang="en-US" sz="2400" dirty="0"/>
           </a:p>
         </p:txBody>
       </p:sp>
@@ -4866,7 +4975,7 @@
         <p:spPr>
           <a:xfrm>
             <a:off x="14177430" y="20536721"/>
-            <a:ext cx="7569236" cy="461665"/>
+            <a:ext cx="7569236" cy="830997"/>
           </a:xfrm>
           <a:prstGeom prst="rect">
             <a:avLst/>
@@ -4882,15 +4991,11 @@
             <a:pPr algn="ctr"/>
             <a:r>
               <a:rPr lang="en-US" sz="2400" b="1" dirty="0" smtClean="0"/>
-              <a:t>Figure </a:t>
-            </a:r>
-            <a:r>
-              <a:rPr lang="en-US" sz="2400" b="1" dirty="0" smtClean="0"/>
-              <a:t>3. </a:t>
-            </a:r>
-            <a:r>
-              <a:rPr lang="en-US" sz="2400" dirty="0" smtClean="0"/>
-              <a:t>Figure 3</a:t>
+              <a:t>Figure 3. </a:t>
+            </a:r>
+            <a:r>
+              <a:rPr lang="en-US" sz="2400" dirty="0" smtClean="0"/>
+              <a:t>RMS Error when using single cell model or model that includes neighboring cells as input</a:t>
             </a:r>
             <a:endParaRPr lang="en-US" sz="2400" dirty="0"/>
           </a:p>
@@ -4905,7 +5010,7 @@
         <p:spPr>
           <a:xfrm>
             <a:off x="26062948" y="6711118"/>
-            <a:ext cx="7569236" cy="461665"/>
+            <a:ext cx="7569236" cy="830997"/>
           </a:xfrm>
           <a:prstGeom prst="rect">
             <a:avLst/>
@@ -4921,15 +5026,11 @@
             <a:pPr algn="ctr"/>
             <a:r>
               <a:rPr lang="en-US" sz="2400" b="1" dirty="0" smtClean="0"/>
-              <a:t>Figure </a:t>
-            </a:r>
-            <a:r>
-              <a:rPr lang="en-US" sz="2400" b="1" dirty="0" smtClean="0"/>
-              <a:t>4. </a:t>
-            </a:r>
-            <a:r>
-              <a:rPr lang="en-US" sz="2400" dirty="0" smtClean="0"/>
-              <a:t>Figure 4</a:t>
+              <a:t>Figure 4. </a:t>
+            </a:r>
+            <a:r>
+              <a:rPr lang="en-US" sz="2400" dirty="0" smtClean="0"/>
+              <a:t>RMS Error when using independent variable model vs. interdependent variables model</a:t>
             </a:r>
             <a:endParaRPr lang="en-US" sz="2400" dirty="0"/>
           </a:p>
@@ -4943,8 +5044,8 @@
         </p:nvSpPr>
         <p:spPr>
           <a:xfrm>
-            <a:off x="26058750" y="11191319"/>
-            <a:ext cx="7569236" cy="461665"/>
+            <a:off x="26058750" y="11842586"/>
+            <a:ext cx="7569236" cy="830997"/>
           </a:xfrm>
           <a:prstGeom prst="rect">
             <a:avLst/>
@@ -4972,7 +5073,23 @@
             </a:r>
             <a:r>
               <a:rPr lang="en-US" sz="2400" dirty="0" smtClean="0"/>
-              <a:t>Figure 5</a:t>
+              <a:t>Training and Test RMS </a:t>
+            </a:r>
+            <a:r>
+              <a:rPr lang="en-US" sz="2400" dirty="0" smtClean="0"/>
+              <a:t>Error as a  function of VAR model lag order </a:t>
+            </a:r>
+            <a:r>
+              <a:rPr lang="en-US" sz="2400" i="1" dirty="0" smtClean="0"/>
+              <a:t>p</a:t>
+            </a:r>
+            <a:r>
+              <a:rPr lang="en-US" sz="2400" dirty="0" smtClean="0"/>
+              <a:t> </a:t>
+            </a:r>
+            <a:r>
+              <a:rPr lang="en-US" sz="2400" dirty="0" smtClean="0"/>
+              <a:t>for multivariable model</a:t>
             </a:r>
             <a:endParaRPr lang="en-US" sz="2400" dirty="0"/>
           </a:p>
@@ -5013,6 +5130,88 @@
           </a:fontRef>
         </p:style>
       </p:cxnSp>
+      <p:pic>
+        <p:nvPicPr>
+          <p:cNvPr id="1028" name="Picture 4" descr="C:\Dev\weathermap\poster\err_test_vs_lag_order_all_vars_single_cell.png"/>
+          <p:cNvPicPr>
+            <a:picLocks noChangeAspect="1" noChangeArrowheads="1"/>
+          </p:cNvPicPr>
+          <p:nvPr/>
+        </p:nvPicPr>
+        <p:blipFill>
+          <a:blip r:embed="rId9" cstate="print">
+            <a:extLst>
+              <a:ext uri="{28A0092B-C50C-407E-A947-70E740481C1C}">
+                <a14:useLocalDpi xmlns:a14="http://schemas.microsoft.com/office/drawing/2010/main" val="0"/>
+              </a:ext>
+            </a:extLst>
+          </a:blip>
+          <a:srcRect/>
+          <a:stretch>
+            <a:fillRect/>
+          </a:stretch>
+        </p:blipFill>
+        <p:spPr bwMode="auto">
+          <a:xfrm>
+            <a:off x="30243585" y="7797524"/>
+            <a:ext cx="4039202" cy="4011963"/>
+          </a:xfrm>
+          <a:prstGeom prst="rect">
+            <a:avLst/>
+          </a:prstGeom>
+          <a:noFill/>
+          <a:extLst>
+            <a:ext uri="{909E8E84-426E-40DD-AFC4-6F175D3DCCD1}">
+              <a14:hiddenFill xmlns:a14="http://schemas.microsoft.com/office/drawing/2010/main">
+                <a:solidFill>
+                  <a:srgbClr val="FFFFFF"/>
+                </a:solidFill>
+              </a14:hiddenFill>
+            </a:ext>
+          </a:extLst>
+        </p:spPr>
+      </p:pic>
+      <p:pic>
+        <p:nvPicPr>
+          <p:cNvPr id="1029" name="Picture 5" descr="C:\Dev\weathermap\poster\err_training_vs_lag_order_all_vars_single_cell.png"/>
+          <p:cNvPicPr>
+            <a:picLocks noChangeAspect="1" noChangeArrowheads="1"/>
+          </p:cNvPicPr>
+          <p:nvPr/>
+        </p:nvPicPr>
+        <p:blipFill>
+          <a:blip r:embed="rId10" cstate="print">
+            <a:extLst>
+              <a:ext uri="{28A0092B-C50C-407E-A947-70E740481C1C}">
+                <a14:useLocalDpi xmlns:a14="http://schemas.microsoft.com/office/drawing/2010/main" val="0"/>
+              </a:ext>
+            </a:extLst>
+          </a:blip>
+          <a:srcRect/>
+          <a:stretch>
+            <a:fillRect/>
+          </a:stretch>
+        </p:blipFill>
+        <p:spPr bwMode="auto">
+          <a:xfrm>
+            <a:off x="24843010" y="7813130"/>
+            <a:ext cx="4039202" cy="3971752"/>
+          </a:xfrm>
+          <a:prstGeom prst="rect">
+            <a:avLst/>
+          </a:prstGeom>
+          <a:noFill/>
+          <a:extLst>
+            <a:ext uri="{909E8E84-426E-40DD-AFC4-6F175D3DCCD1}">
+              <a14:hiddenFill xmlns:a14="http://schemas.microsoft.com/office/drawing/2010/main">
+                <a:solidFill>
+                  <a:srgbClr val="FFFFFF"/>
+                </a:solidFill>
+              </a14:hiddenFill>
+            </a:ext>
+          </a:extLst>
+        </p:spPr>
+      </p:pic>
     </p:spTree>
     <p:extLst>
       <p:ext uri="{BB962C8B-B14F-4D97-AF65-F5344CB8AC3E}">

</xml_diff>